<commit_message>
fix error on 202020 key
</commit_message>
<xml_diff>
--- a/ClassMaterials/ListRecur/11-LCsyntax.pptx
+++ b/ClassMaterials/ListRecur/11-LCsyntax.pptx
@@ -176,6 +176,74 @@
     </p:ext>
   </p:extLst>
 </p:presentation>
+</file>
+
+<file path=ppt/revisionInfo.xml><?xml version="1.0" encoding="utf-8"?>
+<p1510:revInfo xmlns:a="http://schemas.openxmlformats.org/drawingml/2006/main" xmlns:r="http://schemas.openxmlformats.org/officeDocument/2006/relationships" xmlns:p1510="http://schemas.microsoft.com/office/powerpoint/2015/10/main">
+  <p1510:revLst>
+    <p1510:client id="{44883244-0001-4FF1-BC72-4E9304F1E3A2}" v="1" dt="2021-09-20T14:34:02.704"/>
+  </p1510:revLst>
+</p1510:revInfo>
+</file>
+
+<file path=ppt/changesInfos/changesInfo1.xml><?xml version="1.0" encoding="utf-8"?>
+<pc:chgInfo xmlns:a="http://schemas.openxmlformats.org/drawingml/2006/main" xmlns:r="http://schemas.openxmlformats.org/officeDocument/2006/relationships" xmlns:ac="http://schemas.microsoft.com/office/drawing/2013/main/command" xmlns:pc="http://schemas.microsoft.com/office/powerpoint/2013/main/command">
+  <pc:docChgLst>
+    <pc:chgData name="Hewner, Mike" userId="7f3f83dd-6dfb-4127-a87f-c1714bd4fac9" providerId="ADAL" clId="{44883244-0001-4FF1-BC72-4E9304F1E3A2}"/>
+    <pc:docChg chg="modSld">
+      <pc:chgData name="Hewner, Mike" userId="7f3f83dd-6dfb-4127-a87f-c1714bd4fac9" providerId="ADAL" clId="{44883244-0001-4FF1-BC72-4E9304F1E3A2}" dt="2021-09-20T15:07:19.287" v="93" actId="20577"/>
+      <pc:docMkLst>
+        <pc:docMk/>
+      </pc:docMkLst>
+      <pc:sldChg chg="modSp mod">
+        <pc:chgData name="Hewner, Mike" userId="7f3f83dd-6dfb-4127-a87f-c1714bd4fac9" providerId="ADAL" clId="{44883244-0001-4FF1-BC72-4E9304F1E3A2}" dt="2021-09-20T15:07:19.287" v="93" actId="20577"/>
+        <pc:sldMkLst>
+          <pc:docMk/>
+          <pc:sldMk cId="1802653398" sldId="385"/>
+        </pc:sldMkLst>
+        <pc:spChg chg="mod">
+          <ac:chgData name="Hewner, Mike" userId="7f3f83dd-6dfb-4127-a87f-c1714bd4fac9" providerId="ADAL" clId="{44883244-0001-4FF1-BC72-4E9304F1E3A2}" dt="2021-09-20T14:31:41.910" v="5" actId="20577"/>
+          <ac:spMkLst>
+            <pc:docMk/>
+            <pc:sldMk cId="1802653398" sldId="385"/>
+            <ac:spMk id="2" creationId="{00000000-0000-0000-0000-000000000000}"/>
+          </ac:spMkLst>
+        </pc:spChg>
+        <pc:spChg chg="mod">
+          <ac:chgData name="Hewner, Mike" userId="7f3f83dd-6dfb-4127-a87f-c1714bd4fac9" providerId="ADAL" clId="{44883244-0001-4FF1-BC72-4E9304F1E3A2}" dt="2021-09-20T15:07:19.287" v="93" actId="20577"/>
+          <ac:spMkLst>
+            <pc:docMk/>
+            <pc:sldMk cId="1802653398" sldId="385"/>
+            <ac:spMk id="3" creationId="{00000000-0000-0000-0000-000000000000}"/>
+          </ac:spMkLst>
+        </pc:spChg>
+      </pc:sldChg>
+      <pc:sldChg chg="addSp modSp mod">
+        <pc:chgData name="Hewner, Mike" userId="7f3f83dd-6dfb-4127-a87f-c1714bd4fac9" providerId="ADAL" clId="{44883244-0001-4FF1-BC72-4E9304F1E3A2}" dt="2021-09-20T14:34:14.878" v="91" actId="1076"/>
+        <pc:sldMkLst>
+          <pc:docMk/>
+          <pc:sldMk cId="2495832876" sldId="425"/>
+        </pc:sldMkLst>
+        <pc:spChg chg="add mod">
+          <ac:chgData name="Hewner, Mike" userId="7f3f83dd-6dfb-4127-a87f-c1714bd4fac9" providerId="ADAL" clId="{44883244-0001-4FF1-BC72-4E9304F1E3A2}" dt="2021-09-20T14:34:14.878" v="91" actId="1076"/>
+          <ac:spMkLst>
+            <pc:docMk/>
+            <pc:sldMk cId="2495832876" sldId="425"/>
+            <ac:spMk id="4" creationId="{9BF74C62-F31D-41C9-B70A-D2E085ED3DE3}"/>
+          </ac:spMkLst>
+        </pc:spChg>
+        <pc:picChg chg="mod">
+          <ac:chgData name="Hewner, Mike" userId="7f3f83dd-6dfb-4127-a87f-c1714bd4fac9" providerId="ADAL" clId="{44883244-0001-4FF1-BC72-4E9304F1E3A2}" dt="2021-09-20T14:34:10.397" v="90" actId="1076"/>
+          <ac:picMkLst>
+            <pc:docMk/>
+            <pc:sldMk cId="2495832876" sldId="425"/>
+            <ac:picMk id="2" creationId="{AE3F6F83-47C1-4DEF-A49C-BF0CEA1E2904}"/>
+          </ac:picMkLst>
+        </pc:picChg>
+      </pc:sldChg>
+    </pc:docChg>
+  </pc:docChgLst>
+</pc:chgInfo>
 </file>
 
 <file path=ppt/handoutMasters/handoutMaster1.xml><?xml version="1.0" encoding="utf-8"?>
@@ -12191,16 +12259,8 @@
           <a:p>
             <a:r>
               <a:rPr lang="en-US" sz="3600" dirty="0"/>
-              <a:t>Exam 1: Monday, Dec 21</a:t>
-            </a:r>
-            <a:br>
-              <a:rPr lang="en-US" sz="3600" dirty="0"/>
-            </a:br>
-            <a:r>
-              <a:rPr lang="en-US" sz="3200" dirty="0"/>
-              <a:t>6:30-9:00 PM</a:t>
-            </a:r>
-            <a:endParaRPr lang="en-US" sz="3600" dirty="0"/>
+              <a:t>Exam 1 Soon!</a:t>
+            </a:r>
           </a:p>
         </p:txBody>
       </p:sp>
@@ -12217,7 +12277,7 @@
         <p:spPr>
           <a:xfrm>
             <a:off x="1600200" y="1295400"/>
-            <a:ext cx="8915400" cy="6553200"/>
+            <a:ext cx="8915400" cy="5257800"/>
           </a:xfrm>
         </p:spPr>
         <p:txBody>
@@ -12237,14 +12297,22 @@
             </a:r>
             <a:r>
               <a:rPr lang="en-US" sz="2000" dirty="0"/>
-              <a:t>writing implement (pencil or pen).  It is a Moodle quiz, but on some of the questions, you will be allowed to write/draw something and  photograph it for submission.</a:t>
+              <a:t>writing implement (pencil or pen</a:t>
+            </a:r>
+            <a:r>
+              <a:rPr lang="en-US" sz="2000"/>
+              <a:t>). </a:t>
             </a:r>
           </a:p>
           <a:p>
             <a:pPr lvl="1"/>
             <a:r>
+              <a:rPr lang="en-US" sz="2000" b="1"/>
+              <a:t>Computer </a:t>
+            </a:r>
+            <a:r>
               <a:rPr lang="en-US" sz="2000" b="1" dirty="0"/>
-              <a:t>Computer part:  </a:t>
+              <a:t>part:  </a:t>
             </a:r>
             <a:r>
               <a:rPr lang="en-US" sz="2000" dirty="0"/>
@@ -12254,7 +12322,7 @@
           <a:p>
             <a:r>
               <a:rPr lang="en-US" sz="2200" dirty="0"/>
-              <a:t>Exam material: through Day 12 class and A9plus reading assignments through day 10. Nothing on free and bound variables, lexical address. </a:t>
+              <a:t>Exam material: through Day 12 class and A9 plus reading assignments through day 10</a:t>
             </a:r>
           </a:p>
           <a:p>
@@ -12276,7 +12344,7 @@
           <a:p>
             <a:r>
               <a:rPr lang="en-US" sz="2200" dirty="0"/>
-              <a:t>Also some old exams are linked from Day 13</a:t>
+              <a:t>Practice exams in the course repo.  I particularly like 202020</a:t>
             </a:r>
           </a:p>
         </p:txBody>
@@ -12333,7 +12401,7 @@
         </p:blipFill>
         <p:spPr>
           <a:xfrm>
-            <a:off x="3124200" y="152400"/>
+            <a:off x="3200400" y="144646"/>
             <a:ext cx="5638800" cy="6568707"/>
           </a:xfrm>
           <a:prstGeom prst="rect">
@@ -12374,6 +12442,41 @@
             <a:r>
               <a:rPr lang="en-US" sz="1200" dirty="0"/>
               <a:t>A09</a:t>
+            </a:r>
+          </a:p>
+        </p:txBody>
+      </p:sp>
+      <p:sp>
+        <p:nvSpPr>
+          <p:cNvPr id="4" name="TextBox 3">
+            <a:extLst>
+              <a:ext uri="{FF2B5EF4-FFF2-40B4-BE49-F238E27FC236}">
+                <a16:creationId xmlns:a16="http://schemas.microsoft.com/office/drawing/2014/main" id="{9BF74C62-F31D-41C9-B70A-D2E085ED3DE3}"/>
+              </a:ext>
+            </a:extLst>
+          </p:cNvPr>
+          <p:cNvSpPr txBox="1"/>
+          <p:nvPr/>
+        </p:nvSpPr>
+        <p:spPr>
+          <a:xfrm>
+            <a:off x="6172200" y="2895600"/>
+            <a:ext cx="1031051" cy="461665"/>
+          </a:xfrm>
+          <a:prstGeom prst="rect">
+            <a:avLst/>
+          </a:prstGeom>
+          <a:noFill/>
+        </p:spPr>
+        <p:txBody>
+          <a:bodyPr wrap="none" rtlCol="0">
+            <a:spAutoFit/>
+          </a:bodyPr>
+          <a:lstStyle/>
+          <a:p>
+            <a:r>
+              <a:rPr lang="en-US" dirty="0"/>
+              <a:t>+ filter</a:t>
             </a:r>
           </a:p>
         </p:txBody>

</xml_diff>

<commit_message>
lexical address examples as seperate code file
</commit_message>
<xml_diff>
--- a/ClassMaterials/ListRecur/11-LCsyntax.pptx
+++ b/ClassMaterials/ListRecur/11-LCsyntax.pptx
@@ -178,14 +178,6 @@
 </p:presentation>
 </file>
 
-<file path=ppt/revisionInfo.xml><?xml version="1.0" encoding="utf-8"?>
-<p1510:revInfo xmlns:a="http://schemas.openxmlformats.org/drawingml/2006/main" xmlns:r="http://schemas.openxmlformats.org/officeDocument/2006/relationships" xmlns:p1510="http://schemas.microsoft.com/office/powerpoint/2015/10/main">
-  <p1510:revLst>
-    <p1510:client id="{44883244-0001-4FF1-BC72-4E9304F1E3A2}" v="1" dt="2021-09-20T14:34:02.704"/>
-  </p1510:revLst>
-</p1510:revInfo>
-</file>
-
 <file path=ppt/changesInfos/changesInfo1.xml><?xml version="1.0" encoding="utf-8"?>
 <pc:chgInfo xmlns:a="http://schemas.openxmlformats.org/drawingml/2006/main" xmlns:r="http://schemas.openxmlformats.org/officeDocument/2006/relationships" xmlns:ac="http://schemas.microsoft.com/office/drawing/2013/main/command" xmlns:pc="http://schemas.microsoft.com/office/powerpoint/2013/main/command">
   <pc:docChgLst>
@@ -240,6 +232,45 @@
             <ac:picMk id="2" creationId="{AE3F6F83-47C1-4DEF-A49C-BF0CEA1E2904}"/>
           </ac:picMkLst>
         </pc:picChg>
+      </pc:sldChg>
+    </pc:docChg>
+  </pc:docChgLst>
+  <pc:docChgLst>
+    <pc:chgData name="Hewner, Mike" userId="7f3f83dd-6dfb-4127-a87f-c1714bd4fac9" providerId="ADAL" clId="{B448F89D-CC42-4AE2-952A-4D15B019C062}"/>
+    <pc:docChg chg="custSel modSld">
+      <pc:chgData name="Hewner, Mike" userId="7f3f83dd-6dfb-4127-a87f-c1714bd4fac9" providerId="ADAL" clId="{B448F89D-CC42-4AE2-952A-4D15B019C062}" dt="2021-12-16T16:23:56.948" v="37" actId="478"/>
+      <pc:docMkLst>
+        <pc:docMk/>
+      </pc:docMkLst>
+      <pc:sldChg chg="modSp mod">
+        <pc:chgData name="Hewner, Mike" userId="7f3f83dd-6dfb-4127-a87f-c1714bd4fac9" providerId="ADAL" clId="{B448F89D-CC42-4AE2-952A-4D15B019C062}" dt="2021-12-16T16:02:44.652" v="36" actId="20577"/>
+        <pc:sldMkLst>
+          <pc:docMk/>
+          <pc:sldMk cId="1802653398" sldId="385"/>
+        </pc:sldMkLst>
+        <pc:spChg chg="mod">
+          <ac:chgData name="Hewner, Mike" userId="7f3f83dd-6dfb-4127-a87f-c1714bd4fac9" providerId="ADAL" clId="{B448F89D-CC42-4AE2-952A-4D15B019C062}" dt="2021-12-16T16:02:44.652" v="36" actId="20577"/>
+          <ac:spMkLst>
+            <pc:docMk/>
+            <pc:sldMk cId="1802653398" sldId="385"/>
+            <ac:spMk id="3" creationId="{00000000-0000-0000-0000-000000000000}"/>
+          </ac:spMkLst>
+        </pc:spChg>
+      </pc:sldChg>
+      <pc:sldChg chg="delSp mod">
+        <pc:chgData name="Hewner, Mike" userId="7f3f83dd-6dfb-4127-a87f-c1714bd4fac9" providerId="ADAL" clId="{B448F89D-CC42-4AE2-952A-4D15B019C062}" dt="2021-12-16T16:23:56.948" v="37" actId="478"/>
+        <pc:sldMkLst>
+          <pc:docMk/>
+          <pc:sldMk cId="2676271402" sldId="427"/>
+        </pc:sldMkLst>
+        <pc:spChg chg="del">
+          <ac:chgData name="Hewner, Mike" userId="7f3f83dd-6dfb-4127-a87f-c1714bd4fac9" providerId="ADAL" clId="{B448F89D-CC42-4AE2-952A-4D15B019C062}" dt="2021-12-16T16:23:56.948" v="37" actId="478"/>
+          <ac:spMkLst>
+            <pc:docMk/>
+            <pc:sldMk cId="2676271402" sldId="427"/>
+            <ac:spMk id="2" creationId="{8D9E98C2-75CF-40BC-A506-1685D7E3A805}"/>
+          </ac:spMkLst>
+        </pc:spChg>
       </pc:sldChg>
     </pc:docChg>
   </pc:docChgLst>
@@ -5384,31 +5415,6 @@
           <a:chExt cx="0" cy="0"/>
         </a:xfrm>
       </p:grpSpPr>
-      <p:sp>
-        <p:nvSpPr>
-          <p:cNvPr id="2" name="Title 1">
-            <a:extLst>
-              <a:ext uri="{FF2B5EF4-FFF2-40B4-BE49-F238E27FC236}">
-                <a16:creationId xmlns:a16="http://schemas.microsoft.com/office/drawing/2014/main" id="{8D9E98C2-75CF-40BC-A506-1685D7E3A805}"/>
-              </a:ext>
-            </a:extLst>
-          </p:cNvPr>
-          <p:cNvSpPr>
-            <a:spLocks noGrp="1"/>
-          </p:cNvSpPr>
-          <p:nvPr>
-            <p:ph type="title"/>
-          </p:nvPr>
-        </p:nvSpPr>
-        <p:spPr/>
-        <p:txBody>
-          <a:bodyPr/>
-          <a:lstStyle/>
-          <a:p>
-            <a:endParaRPr lang="en-US"/>
-          </a:p>
-        </p:txBody>
-      </p:sp>
       <p:sp>
         <p:nvSpPr>
           <p:cNvPr id="3" name="Content Placeholder 2">
@@ -12297,22 +12303,14 @@
             </a:r>
             <a:r>
               <a:rPr lang="en-US" sz="2000" dirty="0"/>
-              <a:t>writing implement (pencil or pen</a:t>
-            </a:r>
-            <a:r>
-              <a:rPr lang="en-US" sz="2000"/>
-              <a:t>). </a:t>
+              <a:t>writing implement (pencil or pen). </a:t>
             </a:r>
           </a:p>
           <a:p>
             <a:pPr lvl="1"/>
             <a:r>
-              <a:rPr lang="en-US" sz="2000" b="1"/>
-              <a:t>Computer </a:t>
-            </a:r>
-            <a:r>
               <a:rPr lang="en-US" sz="2000" b="1" dirty="0"/>
-              <a:t>part:  </a:t>
+              <a:t>Computer part:  </a:t>
             </a:r>
             <a:r>
               <a:rPr lang="en-US" sz="2000" dirty="0"/>
@@ -12332,7 +12330,7 @@
                   <a:srgbClr val="FFFF00"/>
                 </a:solidFill>
               </a:rPr>
-              <a:t>If you are allowed extra time, today is the last day to tell me.</a:t>
+              <a:t>If you are allowed extra time, look for a form from me</a:t>
             </a:r>
           </a:p>
           <a:p>
@@ -12344,7 +12342,7 @@
           <a:p>
             <a:r>
               <a:rPr lang="en-US" sz="2200" dirty="0"/>
-              <a:t>Practice exams in the course repo.  I particularly like 202020</a:t>
+              <a:t>Practice exams in the course repo.  I particularly like 202210</a:t>
             </a:r>
           </a:p>
         </p:txBody>

</xml_diff>